<commit_message>
final version of initial report
</commit_message>
<xml_diff>
--- a/Project Management/v1/figs/Timetable.pptx
+++ b/Project Management/v1/figs/Timetable.pptx
@@ -2,7 +2,7 @@
 <file path=ppt/presentation.xml><?xml version="1.0" encoding="utf-8"?>
 <p:presentation xmlns:a="http://schemas.openxmlformats.org/drawingml/2006/main" xmlns:r="http://schemas.openxmlformats.org/officeDocument/2006/relationships" xmlns:p="http://schemas.openxmlformats.org/presentationml/2006/main" saveSubsetFonts="1">
   <p:sldMasterIdLst>
-    <p:sldMasterId id="2147483744" r:id="rId1"/>
+    <p:sldMasterId id="2147483780" r:id="rId1"/>
   </p:sldMasterIdLst>
   <p:notesMasterIdLst>
     <p:notesMasterId r:id="rId3"/>
@@ -10,7 +10,7 @@
   <p:sldIdLst>
     <p:sldId id="256" r:id="rId2"/>
   </p:sldIdLst>
-  <p:sldSz cx="3359150" cy="1050925"/>
+  <p:sldSz cx="2743200" cy="960438"/>
   <p:notesSz cx="6858000" cy="9144000"/>
   <p:defaultTextStyle>
     <a:defPPr>
@@ -111,6 +111,9 @@
     <p:ext uri="{EFAFB233-063F-42B5-8137-9DF3F51BA10A}">
       <p15:sldGuideLst xmlns:p15="http://schemas.microsoft.com/office/powerpoint/2012/main"/>
     </p:ext>
+    <p:ext uri="{2D200454-40CA-4A62-9FC3-DE9A4176ACB9}">
+      <p15:notesGuideLst xmlns:p15="http://schemas.microsoft.com/office/powerpoint/2012/main"/>
+    </p:ext>
   </p:extLst>
 </p:presentation>
 </file>
@@ -197,7 +200,7 @@
           <a:p>
             <a:fld id="{1D7C87C3-5A2F-49F3-8A3A-8B62C06B8724}" type="datetimeFigureOut">
               <a:rPr lang="en-GB" smtClean="0"/>
-              <a:t>06/02/2017</a:t>
+              <a:t>07/02/2017</a:t>
             </a:fld>
             <a:endParaRPr lang="en-GB"/>
           </a:p>
@@ -215,8 +218,8 @@
         </p:nvSpPr>
         <p:spPr>
           <a:xfrm>
-            <a:off x="-1503363" y="1143000"/>
-            <a:ext cx="9864726" cy="3086100"/>
+            <a:off x="-977900" y="1143000"/>
+            <a:ext cx="8813800" cy="3086100"/>
           </a:xfrm>
           <a:prstGeom prst="rect">
             <a:avLst/>
@@ -371,8 +374,8 @@
   </p:cSld>
   <p:clrMap bg1="lt1" tx1="dk1" bg2="lt2" tx2="dk2" accent1="accent1" accent2="accent2" accent3="accent3" accent4="accent4" accent5="accent5" accent6="accent6" hlink="hlink" folHlink="folHlink"/>
   <p:notesStyle>
-    <a:lvl1pPr marL="0" algn="l" defTabSz="914400" rtl="0" eaLnBrk="1" latinLnBrk="0" hangingPunct="1">
-      <a:defRPr sz="1200" kern="1200">
+    <a:lvl1pPr marL="0" algn="l" defTabSz="758312" rtl="0" eaLnBrk="1" latinLnBrk="0" hangingPunct="1">
+      <a:defRPr sz="995" kern="1200">
         <a:solidFill>
           <a:schemeClr val="tx1"/>
         </a:solidFill>
@@ -381,8 +384,8 @@
         <a:cs typeface="+mn-cs"/>
       </a:defRPr>
     </a:lvl1pPr>
-    <a:lvl2pPr marL="457200" algn="l" defTabSz="914400" rtl="0" eaLnBrk="1" latinLnBrk="0" hangingPunct="1">
-      <a:defRPr sz="1200" kern="1200">
+    <a:lvl2pPr marL="379156" algn="l" defTabSz="758312" rtl="0" eaLnBrk="1" latinLnBrk="0" hangingPunct="1">
+      <a:defRPr sz="995" kern="1200">
         <a:solidFill>
           <a:schemeClr val="tx1"/>
         </a:solidFill>
@@ -391,8 +394,8 @@
         <a:cs typeface="+mn-cs"/>
       </a:defRPr>
     </a:lvl2pPr>
-    <a:lvl3pPr marL="914400" algn="l" defTabSz="914400" rtl="0" eaLnBrk="1" latinLnBrk="0" hangingPunct="1">
-      <a:defRPr sz="1200" kern="1200">
+    <a:lvl3pPr marL="758312" algn="l" defTabSz="758312" rtl="0" eaLnBrk="1" latinLnBrk="0" hangingPunct="1">
+      <a:defRPr sz="995" kern="1200">
         <a:solidFill>
           <a:schemeClr val="tx1"/>
         </a:solidFill>
@@ -401,8 +404,8 @@
         <a:cs typeface="+mn-cs"/>
       </a:defRPr>
     </a:lvl3pPr>
-    <a:lvl4pPr marL="1371600" algn="l" defTabSz="914400" rtl="0" eaLnBrk="1" latinLnBrk="0" hangingPunct="1">
-      <a:defRPr sz="1200" kern="1200">
+    <a:lvl4pPr marL="1137468" algn="l" defTabSz="758312" rtl="0" eaLnBrk="1" latinLnBrk="0" hangingPunct="1">
+      <a:defRPr sz="995" kern="1200">
         <a:solidFill>
           <a:schemeClr val="tx1"/>
         </a:solidFill>
@@ -411,8 +414,8 @@
         <a:cs typeface="+mn-cs"/>
       </a:defRPr>
     </a:lvl4pPr>
-    <a:lvl5pPr marL="1828800" algn="l" defTabSz="914400" rtl="0" eaLnBrk="1" latinLnBrk="0" hangingPunct="1">
-      <a:defRPr sz="1200" kern="1200">
+    <a:lvl5pPr marL="1516624" algn="l" defTabSz="758312" rtl="0" eaLnBrk="1" latinLnBrk="0" hangingPunct="1">
+      <a:defRPr sz="995" kern="1200">
         <a:solidFill>
           <a:schemeClr val="tx1"/>
         </a:solidFill>
@@ -421,8 +424,8 @@
         <a:cs typeface="+mn-cs"/>
       </a:defRPr>
     </a:lvl5pPr>
-    <a:lvl6pPr marL="2286000" algn="l" defTabSz="914400" rtl="0" eaLnBrk="1" latinLnBrk="0" hangingPunct="1">
-      <a:defRPr sz="1200" kern="1200">
+    <a:lvl6pPr marL="1895780" algn="l" defTabSz="758312" rtl="0" eaLnBrk="1" latinLnBrk="0" hangingPunct="1">
+      <a:defRPr sz="995" kern="1200">
         <a:solidFill>
           <a:schemeClr val="tx1"/>
         </a:solidFill>
@@ -431,8 +434,8 @@
         <a:cs typeface="+mn-cs"/>
       </a:defRPr>
     </a:lvl6pPr>
-    <a:lvl7pPr marL="2743200" algn="l" defTabSz="914400" rtl="0" eaLnBrk="1" latinLnBrk="0" hangingPunct="1">
-      <a:defRPr sz="1200" kern="1200">
+    <a:lvl7pPr marL="2274936" algn="l" defTabSz="758312" rtl="0" eaLnBrk="1" latinLnBrk="0" hangingPunct="1">
+      <a:defRPr sz="995" kern="1200">
         <a:solidFill>
           <a:schemeClr val="tx1"/>
         </a:solidFill>
@@ -441,8 +444,8 @@
         <a:cs typeface="+mn-cs"/>
       </a:defRPr>
     </a:lvl7pPr>
-    <a:lvl8pPr marL="3200400" algn="l" defTabSz="914400" rtl="0" eaLnBrk="1" latinLnBrk="0" hangingPunct="1">
-      <a:defRPr sz="1200" kern="1200">
+    <a:lvl8pPr marL="2654092" algn="l" defTabSz="758312" rtl="0" eaLnBrk="1" latinLnBrk="0" hangingPunct="1">
+      <a:defRPr sz="995" kern="1200">
         <a:solidFill>
           <a:schemeClr val="tx1"/>
         </a:solidFill>
@@ -451,8 +454,8 @@
         <a:cs typeface="+mn-cs"/>
       </a:defRPr>
     </a:lvl8pPr>
-    <a:lvl9pPr marL="3657600" algn="l" defTabSz="914400" rtl="0" eaLnBrk="1" latinLnBrk="0" hangingPunct="1">
-      <a:defRPr sz="1200" kern="1200">
+    <a:lvl9pPr marL="3033248" algn="l" defTabSz="758312" rtl="0" eaLnBrk="1" latinLnBrk="0" hangingPunct="1">
+      <a:defRPr sz="995" kern="1200">
         <a:solidFill>
           <a:schemeClr val="tx1"/>
         </a:solidFill>
@@ -494,15 +497,15 @@
         </p:nvSpPr>
         <p:spPr>
           <a:xfrm>
-            <a:off x="419894" y="171992"/>
-            <a:ext cx="2519363" cy="365878"/>
+            <a:off x="342900" y="157183"/>
+            <a:ext cx="2057400" cy="334375"/>
           </a:xfrm>
         </p:spPr>
         <p:txBody>
           <a:bodyPr anchor="b"/>
           <a:lstStyle>
             <a:lvl1pPr algn="ctr">
-              <a:defRPr sz="919"/>
+              <a:defRPr sz="840"/>
             </a:lvl1pPr>
           </a:lstStyle>
           <a:p>
@@ -526,8 +529,8 @@
         </p:nvSpPr>
         <p:spPr>
           <a:xfrm>
-            <a:off x="419894" y="551979"/>
-            <a:ext cx="2519363" cy="253730"/>
+            <a:off x="342900" y="504453"/>
+            <a:ext cx="2057400" cy="231883"/>
           </a:xfrm>
         </p:spPr>
         <p:txBody>
@@ -535,39 +538,39 @@
           <a:lstStyle>
             <a:lvl1pPr marL="0" indent="0" algn="ctr">
               <a:buNone/>
-              <a:defRPr sz="368"/>
+              <a:defRPr sz="336"/>
             </a:lvl1pPr>
-            <a:lvl2pPr marL="70043" indent="0" algn="ctr">
-              <a:buNone/>
-              <a:defRPr sz="306"/>
+            <a:lvl2pPr marL="64008" indent="0" algn="ctr">
+              <a:buNone/>
+              <a:defRPr sz="280"/>
             </a:lvl2pPr>
-            <a:lvl3pPr marL="140086" indent="0" algn="ctr">
-              <a:buNone/>
-              <a:defRPr sz="276"/>
+            <a:lvl3pPr marL="128016" indent="0" algn="ctr">
+              <a:buNone/>
+              <a:defRPr sz="252"/>
             </a:lvl3pPr>
-            <a:lvl4pPr marL="210129" indent="0" algn="ctr">
-              <a:buNone/>
-              <a:defRPr sz="245"/>
+            <a:lvl4pPr marL="192024" indent="0" algn="ctr">
+              <a:buNone/>
+              <a:defRPr sz="224"/>
             </a:lvl4pPr>
-            <a:lvl5pPr marL="280172" indent="0" algn="ctr">
-              <a:buNone/>
-              <a:defRPr sz="245"/>
+            <a:lvl5pPr marL="256032" indent="0" algn="ctr">
+              <a:buNone/>
+              <a:defRPr sz="224"/>
             </a:lvl5pPr>
-            <a:lvl6pPr marL="350215" indent="0" algn="ctr">
-              <a:buNone/>
-              <a:defRPr sz="245"/>
+            <a:lvl6pPr marL="320040" indent="0" algn="ctr">
+              <a:buNone/>
+              <a:defRPr sz="224"/>
             </a:lvl6pPr>
-            <a:lvl7pPr marL="420258" indent="0" algn="ctr">
-              <a:buNone/>
-              <a:defRPr sz="245"/>
+            <a:lvl7pPr marL="384048" indent="0" algn="ctr">
+              <a:buNone/>
+              <a:defRPr sz="224"/>
             </a:lvl7pPr>
-            <a:lvl8pPr marL="490301" indent="0" algn="ctr">
-              <a:buNone/>
-              <a:defRPr sz="245"/>
+            <a:lvl8pPr marL="448056" indent="0" algn="ctr">
+              <a:buNone/>
+              <a:defRPr sz="224"/>
             </a:lvl8pPr>
-            <a:lvl9pPr marL="560344" indent="0" algn="ctr">
-              <a:buNone/>
-              <a:defRPr sz="245"/>
+            <a:lvl9pPr marL="512064" indent="0" algn="ctr">
+              <a:buNone/>
+              <a:defRPr sz="224"/>
             </a:lvl9pPr>
           </a:lstStyle>
           <a:p>
@@ -596,7 +599,7 @@
           <a:p>
             <a:fld id="{1730E18E-76F0-4C7E-B4CD-A323CD5F40FF}" type="datetimeFigureOut">
               <a:rPr lang="es-MX" smtClean="0"/>
-              <a:t>06/02/2017</a:t>
+              <a:t>07/02/2017</a:t>
             </a:fld>
             <a:endParaRPr lang="es-MX"/>
           </a:p>
@@ -647,7 +650,7 @@
     </p:spTree>
     <p:extLst>
       <p:ext uri="{BB962C8B-B14F-4D97-AF65-F5344CB8AC3E}">
-        <p14:creationId xmlns:p14="http://schemas.microsoft.com/office/powerpoint/2010/main" val="2206935790"/>
+        <p14:creationId xmlns:p14="http://schemas.microsoft.com/office/powerpoint/2010/main" val="2695228272"/>
       </p:ext>
     </p:extLst>
   </p:cSld>
@@ -766,7 +769,7 @@
           <a:p>
             <a:fld id="{1730E18E-76F0-4C7E-B4CD-A323CD5F40FF}" type="datetimeFigureOut">
               <a:rPr lang="es-MX" smtClean="0"/>
-              <a:t>06/02/2017</a:t>
+              <a:t>07/02/2017</a:t>
             </a:fld>
             <a:endParaRPr lang="es-MX"/>
           </a:p>
@@ -817,7 +820,7 @@
     </p:spTree>
     <p:extLst>
       <p:ext uri="{BB962C8B-B14F-4D97-AF65-F5344CB8AC3E}">
-        <p14:creationId xmlns:p14="http://schemas.microsoft.com/office/powerpoint/2010/main" val="3991549850"/>
+        <p14:creationId xmlns:p14="http://schemas.microsoft.com/office/powerpoint/2010/main" val="1206211766"/>
       </p:ext>
     </p:extLst>
   </p:cSld>
@@ -856,8 +859,8 @@
         </p:nvSpPr>
         <p:spPr>
           <a:xfrm>
-            <a:off x="2403892" y="55952"/>
-            <a:ext cx="724317" cy="890610"/>
+            <a:off x="1963102" y="51134"/>
+            <a:ext cx="591503" cy="813927"/>
           </a:xfrm>
         </p:spPr>
         <p:txBody>
@@ -884,8 +887,8 @@
         </p:nvSpPr>
         <p:spPr>
           <a:xfrm>
-            <a:off x="230941" y="55952"/>
-            <a:ext cx="2130961" cy="890610"/>
+            <a:off x="188595" y="51134"/>
+            <a:ext cx="1740218" cy="813927"/>
           </a:xfrm>
         </p:spPr>
         <p:txBody>
@@ -946,7 +949,7 @@
           <a:p>
             <a:fld id="{1730E18E-76F0-4C7E-B4CD-A323CD5F40FF}" type="datetimeFigureOut">
               <a:rPr lang="es-MX" smtClean="0"/>
-              <a:t>06/02/2017</a:t>
+              <a:t>07/02/2017</a:t>
             </a:fld>
             <a:endParaRPr lang="es-MX"/>
           </a:p>
@@ -997,7 +1000,7 @@
     </p:spTree>
     <p:extLst>
       <p:ext uri="{BB962C8B-B14F-4D97-AF65-F5344CB8AC3E}">
-        <p14:creationId xmlns:p14="http://schemas.microsoft.com/office/powerpoint/2010/main" val="4281942134"/>
+        <p14:creationId xmlns:p14="http://schemas.microsoft.com/office/powerpoint/2010/main" val="3485436743"/>
       </p:ext>
     </p:extLst>
   </p:cSld>
@@ -1116,7 +1119,7 @@
           <a:p>
             <a:fld id="{1730E18E-76F0-4C7E-B4CD-A323CD5F40FF}" type="datetimeFigureOut">
               <a:rPr lang="es-MX" smtClean="0"/>
-              <a:t>06/02/2017</a:t>
+              <a:t>07/02/2017</a:t>
             </a:fld>
             <a:endParaRPr lang="es-MX"/>
           </a:p>
@@ -1167,7 +1170,7 @@
     </p:spTree>
     <p:extLst>
       <p:ext uri="{BB962C8B-B14F-4D97-AF65-F5344CB8AC3E}">
-        <p14:creationId xmlns:p14="http://schemas.microsoft.com/office/powerpoint/2010/main" val="3911165468"/>
+        <p14:creationId xmlns:p14="http://schemas.microsoft.com/office/powerpoint/2010/main" val="1253882039"/>
       </p:ext>
     </p:extLst>
   </p:cSld>
@@ -1206,15 +1209,15 @@
         </p:nvSpPr>
         <p:spPr>
           <a:xfrm>
-            <a:off x="229192" y="262001"/>
-            <a:ext cx="2897267" cy="437156"/>
+            <a:off x="187166" y="239443"/>
+            <a:ext cx="2366010" cy="399515"/>
           </a:xfrm>
         </p:spPr>
         <p:txBody>
           <a:bodyPr anchor="b"/>
           <a:lstStyle>
             <a:lvl1pPr>
-              <a:defRPr sz="919"/>
+              <a:defRPr sz="840"/>
             </a:lvl1pPr>
           </a:lstStyle>
           <a:p>
@@ -1238,8 +1241,8 @@
         </p:nvSpPr>
         <p:spPr>
           <a:xfrm>
-            <a:off x="229192" y="703293"/>
-            <a:ext cx="2897267" cy="229890"/>
+            <a:off x="187166" y="642738"/>
+            <a:ext cx="2366010" cy="210096"/>
           </a:xfrm>
         </p:spPr>
         <p:txBody>
@@ -1247,7 +1250,7 @@
           <a:lstStyle>
             <a:lvl1pPr marL="0" indent="0">
               <a:buNone/>
-              <a:defRPr sz="368">
+              <a:defRPr sz="336">
                 <a:solidFill>
                   <a:schemeClr val="tx1">
                     <a:tint val="75000"/>
@@ -1255,9 +1258,9 @@
                 </a:solidFill>
               </a:defRPr>
             </a:lvl1pPr>
-            <a:lvl2pPr marL="70043" indent="0">
-              <a:buNone/>
-              <a:defRPr sz="306">
+            <a:lvl2pPr marL="64008" indent="0">
+              <a:buNone/>
+              <a:defRPr sz="280">
                 <a:solidFill>
                   <a:schemeClr val="tx1">
                     <a:tint val="75000"/>
@@ -1265,9 +1268,9 @@
                 </a:solidFill>
               </a:defRPr>
             </a:lvl2pPr>
-            <a:lvl3pPr marL="140086" indent="0">
-              <a:buNone/>
-              <a:defRPr sz="276">
+            <a:lvl3pPr marL="128016" indent="0">
+              <a:buNone/>
+              <a:defRPr sz="252">
                 <a:solidFill>
                   <a:schemeClr val="tx1">
                     <a:tint val="75000"/>
@@ -1275,9 +1278,9 @@
                 </a:solidFill>
               </a:defRPr>
             </a:lvl3pPr>
-            <a:lvl4pPr marL="210129" indent="0">
-              <a:buNone/>
-              <a:defRPr sz="245">
+            <a:lvl4pPr marL="192024" indent="0">
+              <a:buNone/>
+              <a:defRPr sz="224">
                 <a:solidFill>
                   <a:schemeClr val="tx1">
                     <a:tint val="75000"/>
@@ -1285,9 +1288,9 @@
                 </a:solidFill>
               </a:defRPr>
             </a:lvl4pPr>
-            <a:lvl5pPr marL="280172" indent="0">
-              <a:buNone/>
-              <a:defRPr sz="245">
+            <a:lvl5pPr marL="256032" indent="0">
+              <a:buNone/>
+              <a:defRPr sz="224">
                 <a:solidFill>
                   <a:schemeClr val="tx1">
                     <a:tint val="75000"/>
@@ -1295,9 +1298,9 @@
                 </a:solidFill>
               </a:defRPr>
             </a:lvl5pPr>
-            <a:lvl6pPr marL="350215" indent="0">
-              <a:buNone/>
-              <a:defRPr sz="245">
+            <a:lvl6pPr marL="320040" indent="0">
+              <a:buNone/>
+              <a:defRPr sz="224">
                 <a:solidFill>
                   <a:schemeClr val="tx1">
                     <a:tint val="75000"/>
@@ -1305,9 +1308,9 @@
                 </a:solidFill>
               </a:defRPr>
             </a:lvl6pPr>
-            <a:lvl7pPr marL="420258" indent="0">
-              <a:buNone/>
-              <a:defRPr sz="245">
+            <a:lvl7pPr marL="384048" indent="0">
+              <a:buNone/>
+              <a:defRPr sz="224">
                 <a:solidFill>
                   <a:schemeClr val="tx1">
                     <a:tint val="75000"/>
@@ -1315,9 +1318,9 @@
                 </a:solidFill>
               </a:defRPr>
             </a:lvl7pPr>
-            <a:lvl8pPr marL="490301" indent="0">
-              <a:buNone/>
-              <a:defRPr sz="245">
+            <a:lvl8pPr marL="448056" indent="0">
+              <a:buNone/>
+              <a:defRPr sz="224">
                 <a:solidFill>
                   <a:schemeClr val="tx1">
                     <a:tint val="75000"/>
@@ -1325,9 +1328,9 @@
                 </a:solidFill>
               </a:defRPr>
             </a:lvl8pPr>
-            <a:lvl9pPr marL="560344" indent="0">
-              <a:buNone/>
-              <a:defRPr sz="245">
+            <a:lvl9pPr marL="512064" indent="0">
+              <a:buNone/>
+              <a:defRPr sz="224">
                 <a:solidFill>
                   <a:schemeClr val="tx1">
                     <a:tint val="75000"/>
@@ -1362,7 +1365,7 @@
           <a:p>
             <a:fld id="{1730E18E-76F0-4C7E-B4CD-A323CD5F40FF}" type="datetimeFigureOut">
               <a:rPr lang="es-MX" smtClean="0"/>
-              <a:t>06/02/2017</a:t>
+              <a:t>07/02/2017</a:t>
             </a:fld>
             <a:endParaRPr lang="es-MX"/>
           </a:p>
@@ -1413,7 +1416,7 @@
     </p:spTree>
     <p:extLst>
       <p:ext uri="{BB962C8B-B14F-4D97-AF65-F5344CB8AC3E}">
-        <p14:creationId xmlns:p14="http://schemas.microsoft.com/office/powerpoint/2010/main" val="455852297"/>
+        <p14:creationId xmlns:p14="http://schemas.microsoft.com/office/powerpoint/2010/main" val="3954116163"/>
       </p:ext>
     </p:extLst>
   </p:cSld>
@@ -1475,8 +1478,8 @@
         </p:nvSpPr>
         <p:spPr>
           <a:xfrm>
-            <a:off x="230941" y="279760"/>
-            <a:ext cx="1427639" cy="666802"/>
+            <a:off x="188595" y="255672"/>
+            <a:ext cx="1165860" cy="609389"/>
           </a:xfrm>
         </p:spPr>
         <p:txBody>
@@ -1532,8 +1535,8 @@
         </p:nvSpPr>
         <p:spPr>
           <a:xfrm>
-            <a:off x="1700570" y="279760"/>
-            <a:ext cx="1427639" cy="666802"/>
+            <a:off x="1388745" y="255672"/>
+            <a:ext cx="1165860" cy="609389"/>
           </a:xfrm>
         </p:spPr>
         <p:txBody>
@@ -1594,7 +1597,7 @@
           <a:p>
             <a:fld id="{1730E18E-76F0-4C7E-B4CD-A323CD5F40FF}" type="datetimeFigureOut">
               <a:rPr lang="es-MX" smtClean="0"/>
-              <a:t>06/02/2017</a:t>
+              <a:t>07/02/2017</a:t>
             </a:fld>
             <a:endParaRPr lang="es-MX"/>
           </a:p>
@@ -1645,7 +1648,7 @@
     </p:spTree>
     <p:extLst>
       <p:ext uri="{BB962C8B-B14F-4D97-AF65-F5344CB8AC3E}">
-        <p14:creationId xmlns:p14="http://schemas.microsoft.com/office/powerpoint/2010/main" val="982658793"/>
+        <p14:creationId xmlns:p14="http://schemas.microsoft.com/office/powerpoint/2010/main" val="2095308484"/>
       </p:ext>
     </p:extLst>
   </p:cSld>
@@ -1684,8 +1687,8 @@
         </p:nvSpPr>
         <p:spPr>
           <a:xfrm>
-            <a:off x="231379" y="55952"/>
-            <a:ext cx="2897267" cy="203130"/>
+            <a:off x="188952" y="51135"/>
+            <a:ext cx="2366010" cy="185640"/>
           </a:xfrm>
         </p:spPr>
         <p:txBody>
@@ -1712,8 +1715,8 @@
         </p:nvSpPr>
         <p:spPr>
           <a:xfrm>
-            <a:off x="231379" y="257623"/>
-            <a:ext cx="1421078" cy="126257"/>
+            <a:off x="188952" y="235441"/>
+            <a:ext cx="1160502" cy="115386"/>
           </a:xfrm>
         </p:spPr>
         <p:txBody>
@@ -1721,39 +1724,39 @@
           <a:lstStyle>
             <a:lvl1pPr marL="0" indent="0">
               <a:buNone/>
-              <a:defRPr sz="368" b="1"/>
+              <a:defRPr sz="336" b="1"/>
             </a:lvl1pPr>
-            <a:lvl2pPr marL="70043" indent="0">
-              <a:buNone/>
-              <a:defRPr sz="306" b="1"/>
+            <a:lvl2pPr marL="64008" indent="0">
+              <a:buNone/>
+              <a:defRPr sz="280" b="1"/>
             </a:lvl2pPr>
-            <a:lvl3pPr marL="140086" indent="0">
-              <a:buNone/>
-              <a:defRPr sz="276" b="1"/>
+            <a:lvl3pPr marL="128016" indent="0">
+              <a:buNone/>
+              <a:defRPr sz="252" b="1"/>
             </a:lvl3pPr>
-            <a:lvl4pPr marL="210129" indent="0">
-              <a:buNone/>
-              <a:defRPr sz="245" b="1"/>
+            <a:lvl4pPr marL="192024" indent="0">
+              <a:buNone/>
+              <a:defRPr sz="224" b="1"/>
             </a:lvl4pPr>
-            <a:lvl5pPr marL="280172" indent="0">
-              <a:buNone/>
-              <a:defRPr sz="245" b="1"/>
+            <a:lvl5pPr marL="256032" indent="0">
+              <a:buNone/>
+              <a:defRPr sz="224" b="1"/>
             </a:lvl5pPr>
-            <a:lvl6pPr marL="350215" indent="0">
-              <a:buNone/>
-              <a:defRPr sz="245" b="1"/>
+            <a:lvl6pPr marL="320040" indent="0">
+              <a:buNone/>
+              <a:defRPr sz="224" b="1"/>
             </a:lvl6pPr>
-            <a:lvl7pPr marL="420258" indent="0">
-              <a:buNone/>
-              <a:defRPr sz="245" b="1"/>
+            <a:lvl7pPr marL="384048" indent="0">
+              <a:buNone/>
+              <a:defRPr sz="224" b="1"/>
             </a:lvl7pPr>
-            <a:lvl8pPr marL="490301" indent="0">
-              <a:buNone/>
-              <a:defRPr sz="245" b="1"/>
+            <a:lvl8pPr marL="448056" indent="0">
+              <a:buNone/>
+              <a:defRPr sz="224" b="1"/>
             </a:lvl8pPr>
-            <a:lvl9pPr marL="560344" indent="0">
-              <a:buNone/>
-              <a:defRPr sz="245" b="1"/>
+            <a:lvl9pPr marL="512064" indent="0">
+              <a:buNone/>
+              <a:defRPr sz="224" b="1"/>
             </a:lvl9pPr>
           </a:lstStyle>
           <a:p>
@@ -1777,8 +1780,8 @@
         </p:nvSpPr>
         <p:spPr>
           <a:xfrm>
-            <a:off x="231379" y="383880"/>
-            <a:ext cx="1421078" cy="564629"/>
+            <a:off x="188952" y="350827"/>
+            <a:ext cx="1160502" cy="516013"/>
           </a:xfrm>
         </p:spPr>
         <p:txBody>
@@ -1834,8 +1837,8 @@
         </p:nvSpPr>
         <p:spPr>
           <a:xfrm>
-            <a:off x="1700570" y="257623"/>
-            <a:ext cx="1428076" cy="126257"/>
+            <a:off x="1388745" y="235441"/>
+            <a:ext cx="1166217" cy="115386"/>
           </a:xfrm>
         </p:spPr>
         <p:txBody>
@@ -1843,39 +1846,39 @@
           <a:lstStyle>
             <a:lvl1pPr marL="0" indent="0">
               <a:buNone/>
-              <a:defRPr sz="368" b="1"/>
+              <a:defRPr sz="336" b="1"/>
             </a:lvl1pPr>
-            <a:lvl2pPr marL="70043" indent="0">
-              <a:buNone/>
-              <a:defRPr sz="306" b="1"/>
+            <a:lvl2pPr marL="64008" indent="0">
+              <a:buNone/>
+              <a:defRPr sz="280" b="1"/>
             </a:lvl2pPr>
-            <a:lvl3pPr marL="140086" indent="0">
-              <a:buNone/>
-              <a:defRPr sz="276" b="1"/>
+            <a:lvl3pPr marL="128016" indent="0">
+              <a:buNone/>
+              <a:defRPr sz="252" b="1"/>
             </a:lvl3pPr>
-            <a:lvl4pPr marL="210129" indent="0">
-              <a:buNone/>
-              <a:defRPr sz="245" b="1"/>
+            <a:lvl4pPr marL="192024" indent="0">
+              <a:buNone/>
+              <a:defRPr sz="224" b="1"/>
             </a:lvl4pPr>
-            <a:lvl5pPr marL="280172" indent="0">
-              <a:buNone/>
-              <a:defRPr sz="245" b="1"/>
+            <a:lvl5pPr marL="256032" indent="0">
+              <a:buNone/>
+              <a:defRPr sz="224" b="1"/>
             </a:lvl5pPr>
-            <a:lvl6pPr marL="350215" indent="0">
-              <a:buNone/>
-              <a:defRPr sz="245" b="1"/>
+            <a:lvl6pPr marL="320040" indent="0">
+              <a:buNone/>
+              <a:defRPr sz="224" b="1"/>
             </a:lvl6pPr>
-            <a:lvl7pPr marL="420258" indent="0">
-              <a:buNone/>
-              <a:defRPr sz="245" b="1"/>
+            <a:lvl7pPr marL="384048" indent="0">
+              <a:buNone/>
+              <a:defRPr sz="224" b="1"/>
             </a:lvl7pPr>
-            <a:lvl8pPr marL="490301" indent="0">
-              <a:buNone/>
-              <a:defRPr sz="245" b="1"/>
+            <a:lvl8pPr marL="448056" indent="0">
+              <a:buNone/>
+              <a:defRPr sz="224" b="1"/>
             </a:lvl8pPr>
-            <a:lvl9pPr marL="560344" indent="0">
-              <a:buNone/>
-              <a:defRPr sz="245" b="1"/>
+            <a:lvl9pPr marL="512064" indent="0">
+              <a:buNone/>
+              <a:defRPr sz="224" b="1"/>
             </a:lvl9pPr>
           </a:lstStyle>
           <a:p>
@@ -1899,8 +1902,8 @@
         </p:nvSpPr>
         <p:spPr>
           <a:xfrm>
-            <a:off x="1700570" y="383880"/>
-            <a:ext cx="1428076" cy="564629"/>
+            <a:off x="1388745" y="350827"/>
+            <a:ext cx="1166217" cy="516013"/>
           </a:xfrm>
         </p:spPr>
         <p:txBody>
@@ -1961,7 +1964,7 @@
           <a:p>
             <a:fld id="{1730E18E-76F0-4C7E-B4CD-A323CD5F40FF}" type="datetimeFigureOut">
               <a:rPr lang="es-MX" smtClean="0"/>
-              <a:t>06/02/2017</a:t>
+              <a:t>07/02/2017</a:t>
             </a:fld>
             <a:endParaRPr lang="es-MX"/>
           </a:p>
@@ -2012,7 +2015,7 @@
     </p:spTree>
     <p:extLst>
       <p:ext uri="{BB962C8B-B14F-4D97-AF65-F5344CB8AC3E}">
-        <p14:creationId xmlns:p14="http://schemas.microsoft.com/office/powerpoint/2010/main" val="3434048"/>
+        <p14:creationId xmlns:p14="http://schemas.microsoft.com/office/powerpoint/2010/main" val="1737040400"/>
       </p:ext>
     </p:extLst>
   </p:cSld>
@@ -2079,7 +2082,7 @@
           <a:p>
             <a:fld id="{1730E18E-76F0-4C7E-B4CD-A323CD5F40FF}" type="datetimeFigureOut">
               <a:rPr lang="es-MX" smtClean="0"/>
-              <a:t>06/02/2017</a:t>
+              <a:t>07/02/2017</a:t>
             </a:fld>
             <a:endParaRPr lang="es-MX"/>
           </a:p>
@@ -2130,7 +2133,7 @@
     </p:spTree>
     <p:extLst>
       <p:ext uri="{BB962C8B-B14F-4D97-AF65-F5344CB8AC3E}">
-        <p14:creationId xmlns:p14="http://schemas.microsoft.com/office/powerpoint/2010/main" val="2002059569"/>
+        <p14:creationId xmlns:p14="http://schemas.microsoft.com/office/powerpoint/2010/main" val="3677018387"/>
       </p:ext>
     </p:extLst>
   </p:cSld>
@@ -2174,7 +2177,7 @@
           <a:p>
             <a:fld id="{1730E18E-76F0-4C7E-B4CD-A323CD5F40FF}" type="datetimeFigureOut">
               <a:rPr lang="es-MX" smtClean="0"/>
-              <a:t>06/02/2017</a:t>
+              <a:t>07/02/2017</a:t>
             </a:fld>
             <a:endParaRPr lang="es-MX"/>
           </a:p>
@@ -2225,7 +2228,7 @@
     </p:spTree>
     <p:extLst>
       <p:ext uri="{BB962C8B-B14F-4D97-AF65-F5344CB8AC3E}">
-        <p14:creationId xmlns:p14="http://schemas.microsoft.com/office/powerpoint/2010/main" val="3158941487"/>
+        <p14:creationId xmlns:p14="http://schemas.microsoft.com/office/powerpoint/2010/main" val="891585282"/>
       </p:ext>
     </p:extLst>
   </p:cSld>
@@ -2264,15 +2267,15 @@
         </p:nvSpPr>
         <p:spPr>
           <a:xfrm>
-            <a:off x="231379" y="70062"/>
-            <a:ext cx="1083413" cy="245216"/>
+            <a:off x="188953" y="64029"/>
+            <a:ext cx="884753" cy="224102"/>
           </a:xfrm>
         </p:spPr>
         <p:txBody>
           <a:bodyPr anchor="b"/>
           <a:lstStyle>
             <a:lvl1pPr>
-              <a:defRPr sz="490"/>
+              <a:defRPr sz="448"/>
             </a:lvl1pPr>
           </a:lstStyle>
           <a:p>
@@ -2296,39 +2299,39 @@
         </p:nvSpPr>
         <p:spPr>
           <a:xfrm>
-            <a:off x="1428076" y="151314"/>
-            <a:ext cx="1700570" cy="746838"/>
+            <a:off x="1166217" y="138286"/>
+            <a:ext cx="1388745" cy="682533"/>
           </a:xfrm>
         </p:spPr>
         <p:txBody>
           <a:bodyPr/>
           <a:lstStyle>
             <a:lvl1pPr>
-              <a:defRPr sz="490"/>
+              <a:defRPr sz="448"/>
             </a:lvl1pPr>
             <a:lvl2pPr>
-              <a:defRPr sz="429"/>
+              <a:defRPr sz="392"/>
             </a:lvl2pPr>
             <a:lvl3pPr>
-              <a:defRPr sz="368"/>
+              <a:defRPr sz="336"/>
             </a:lvl3pPr>
             <a:lvl4pPr>
-              <a:defRPr sz="306"/>
+              <a:defRPr sz="280"/>
             </a:lvl4pPr>
             <a:lvl5pPr>
-              <a:defRPr sz="306"/>
+              <a:defRPr sz="280"/>
             </a:lvl5pPr>
             <a:lvl6pPr>
-              <a:defRPr sz="306"/>
+              <a:defRPr sz="280"/>
             </a:lvl6pPr>
             <a:lvl7pPr>
-              <a:defRPr sz="306"/>
+              <a:defRPr sz="280"/>
             </a:lvl7pPr>
             <a:lvl8pPr>
-              <a:defRPr sz="306"/>
+              <a:defRPr sz="280"/>
             </a:lvl8pPr>
             <a:lvl9pPr>
-              <a:defRPr sz="306"/>
+              <a:defRPr sz="280"/>
             </a:lvl9pPr>
           </a:lstStyle>
           <a:p>
@@ -2381,8 +2384,8 @@
         </p:nvSpPr>
         <p:spPr>
           <a:xfrm>
-            <a:off x="231379" y="315277"/>
-            <a:ext cx="1083413" cy="584091"/>
+            <a:off x="188953" y="288131"/>
+            <a:ext cx="884753" cy="533799"/>
           </a:xfrm>
         </p:spPr>
         <p:txBody>
@@ -2390,39 +2393,39 @@
           <a:lstStyle>
             <a:lvl1pPr marL="0" indent="0">
               <a:buNone/>
-              <a:defRPr sz="245"/>
+              <a:defRPr sz="224"/>
             </a:lvl1pPr>
-            <a:lvl2pPr marL="70043" indent="0">
-              <a:buNone/>
-              <a:defRPr sz="214"/>
+            <a:lvl2pPr marL="64008" indent="0">
+              <a:buNone/>
+              <a:defRPr sz="196"/>
             </a:lvl2pPr>
-            <a:lvl3pPr marL="140086" indent="0">
-              <a:buNone/>
-              <a:defRPr sz="184"/>
+            <a:lvl3pPr marL="128016" indent="0">
+              <a:buNone/>
+              <a:defRPr sz="168"/>
             </a:lvl3pPr>
-            <a:lvl4pPr marL="210129" indent="0">
-              <a:buNone/>
-              <a:defRPr sz="153"/>
+            <a:lvl4pPr marL="192024" indent="0">
+              <a:buNone/>
+              <a:defRPr sz="140"/>
             </a:lvl4pPr>
-            <a:lvl5pPr marL="280172" indent="0">
-              <a:buNone/>
-              <a:defRPr sz="153"/>
+            <a:lvl5pPr marL="256032" indent="0">
+              <a:buNone/>
+              <a:defRPr sz="140"/>
             </a:lvl5pPr>
-            <a:lvl6pPr marL="350215" indent="0">
-              <a:buNone/>
-              <a:defRPr sz="153"/>
+            <a:lvl6pPr marL="320040" indent="0">
+              <a:buNone/>
+              <a:defRPr sz="140"/>
             </a:lvl6pPr>
-            <a:lvl7pPr marL="420258" indent="0">
-              <a:buNone/>
-              <a:defRPr sz="153"/>
+            <a:lvl7pPr marL="384048" indent="0">
+              <a:buNone/>
+              <a:defRPr sz="140"/>
             </a:lvl7pPr>
-            <a:lvl8pPr marL="490301" indent="0">
-              <a:buNone/>
-              <a:defRPr sz="153"/>
+            <a:lvl8pPr marL="448056" indent="0">
+              <a:buNone/>
+              <a:defRPr sz="140"/>
             </a:lvl8pPr>
-            <a:lvl9pPr marL="560344" indent="0">
-              <a:buNone/>
-              <a:defRPr sz="153"/>
+            <a:lvl9pPr marL="512064" indent="0">
+              <a:buNone/>
+              <a:defRPr sz="140"/>
             </a:lvl9pPr>
           </a:lstStyle>
           <a:p>
@@ -2451,7 +2454,7 @@
           <a:p>
             <a:fld id="{1730E18E-76F0-4C7E-B4CD-A323CD5F40FF}" type="datetimeFigureOut">
               <a:rPr lang="es-MX" smtClean="0"/>
-              <a:t>06/02/2017</a:t>
+              <a:t>07/02/2017</a:t>
             </a:fld>
             <a:endParaRPr lang="es-MX"/>
           </a:p>
@@ -2502,7 +2505,7 @@
     </p:spTree>
     <p:extLst>
       <p:ext uri="{BB962C8B-B14F-4D97-AF65-F5344CB8AC3E}">
-        <p14:creationId xmlns:p14="http://schemas.microsoft.com/office/powerpoint/2010/main" val="523970590"/>
+        <p14:creationId xmlns:p14="http://schemas.microsoft.com/office/powerpoint/2010/main" val="620520130"/>
       </p:ext>
     </p:extLst>
   </p:cSld>
@@ -2541,15 +2544,15 @@
         </p:nvSpPr>
         <p:spPr>
           <a:xfrm>
-            <a:off x="231379" y="70062"/>
-            <a:ext cx="1083413" cy="245216"/>
+            <a:off x="188953" y="64029"/>
+            <a:ext cx="884753" cy="224102"/>
           </a:xfrm>
         </p:spPr>
         <p:txBody>
           <a:bodyPr anchor="b"/>
           <a:lstStyle>
             <a:lvl1pPr>
-              <a:defRPr sz="490"/>
+              <a:defRPr sz="448"/>
             </a:lvl1pPr>
           </a:lstStyle>
           <a:p>
@@ -2573,8 +2576,8 @@
         </p:nvSpPr>
         <p:spPr>
           <a:xfrm>
-            <a:off x="1428076" y="151314"/>
-            <a:ext cx="1700570" cy="746838"/>
+            <a:off x="1166217" y="138286"/>
+            <a:ext cx="1388745" cy="682533"/>
           </a:xfrm>
         </p:spPr>
         <p:txBody>
@@ -2582,39 +2585,39 @@
           <a:lstStyle>
             <a:lvl1pPr marL="0" indent="0">
               <a:buNone/>
-              <a:defRPr sz="490"/>
+              <a:defRPr sz="448"/>
             </a:lvl1pPr>
-            <a:lvl2pPr marL="70043" indent="0">
-              <a:buNone/>
-              <a:defRPr sz="429"/>
+            <a:lvl2pPr marL="64008" indent="0">
+              <a:buNone/>
+              <a:defRPr sz="392"/>
             </a:lvl2pPr>
-            <a:lvl3pPr marL="140086" indent="0">
-              <a:buNone/>
-              <a:defRPr sz="368"/>
+            <a:lvl3pPr marL="128016" indent="0">
+              <a:buNone/>
+              <a:defRPr sz="336"/>
             </a:lvl3pPr>
-            <a:lvl4pPr marL="210129" indent="0">
-              <a:buNone/>
-              <a:defRPr sz="306"/>
+            <a:lvl4pPr marL="192024" indent="0">
+              <a:buNone/>
+              <a:defRPr sz="280"/>
             </a:lvl4pPr>
-            <a:lvl5pPr marL="280172" indent="0">
-              <a:buNone/>
-              <a:defRPr sz="306"/>
+            <a:lvl5pPr marL="256032" indent="0">
+              <a:buNone/>
+              <a:defRPr sz="280"/>
             </a:lvl5pPr>
-            <a:lvl6pPr marL="350215" indent="0">
-              <a:buNone/>
-              <a:defRPr sz="306"/>
+            <a:lvl6pPr marL="320040" indent="0">
+              <a:buNone/>
+              <a:defRPr sz="280"/>
             </a:lvl6pPr>
-            <a:lvl7pPr marL="420258" indent="0">
-              <a:buNone/>
-              <a:defRPr sz="306"/>
+            <a:lvl7pPr marL="384048" indent="0">
+              <a:buNone/>
+              <a:defRPr sz="280"/>
             </a:lvl7pPr>
-            <a:lvl8pPr marL="490301" indent="0">
-              <a:buNone/>
-              <a:defRPr sz="306"/>
+            <a:lvl8pPr marL="448056" indent="0">
+              <a:buNone/>
+              <a:defRPr sz="280"/>
             </a:lvl8pPr>
-            <a:lvl9pPr marL="560344" indent="0">
-              <a:buNone/>
-              <a:defRPr sz="306"/>
+            <a:lvl9pPr marL="512064" indent="0">
+              <a:buNone/>
+              <a:defRPr sz="280"/>
             </a:lvl9pPr>
           </a:lstStyle>
           <a:p>
@@ -2638,8 +2641,8 @@
         </p:nvSpPr>
         <p:spPr>
           <a:xfrm>
-            <a:off x="231379" y="315277"/>
-            <a:ext cx="1083413" cy="584091"/>
+            <a:off x="188953" y="288131"/>
+            <a:ext cx="884753" cy="533799"/>
           </a:xfrm>
         </p:spPr>
         <p:txBody>
@@ -2647,39 +2650,39 @@
           <a:lstStyle>
             <a:lvl1pPr marL="0" indent="0">
               <a:buNone/>
-              <a:defRPr sz="245"/>
+              <a:defRPr sz="224"/>
             </a:lvl1pPr>
-            <a:lvl2pPr marL="70043" indent="0">
-              <a:buNone/>
-              <a:defRPr sz="214"/>
+            <a:lvl2pPr marL="64008" indent="0">
+              <a:buNone/>
+              <a:defRPr sz="196"/>
             </a:lvl2pPr>
-            <a:lvl3pPr marL="140086" indent="0">
-              <a:buNone/>
-              <a:defRPr sz="184"/>
+            <a:lvl3pPr marL="128016" indent="0">
+              <a:buNone/>
+              <a:defRPr sz="168"/>
             </a:lvl3pPr>
-            <a:lvl4pPr marL="210129" indent="0">
-              <a:buNone/>
-              <a:defRPr sz="153"/>
+            <a:lvl4pPr marL="192024" indent="0">
+              <a:buNone/>
+              <a:defRPr sz="140"/>
             </a:lvl4pPr>
-            <a:lvl5pPr marL="280172" indent="0">
-              <a:buNone/>
-              <a:defRPr sz="153"/>
+            <a:lvl5pPr marL="256032" indent="0">
+              <a:buNone/>
+              <a:defRPr sz="140"/>
             </a:lvl5pPr>
-            <a:lvl6pPr marL="350215" indent="0">
-              <a:buNone/>
-              <a:defRPr sz="153"/>
+            <a:lvl6pPr marL="320040" indent="0">
+              <a:buNone/>
+              <a:defRPr sz="140"/>
             </a:lvl6pPr>
-            <a:lvl7pPr marL="420258" indent="0">
-              <a:buNone/>
-              <a:defRPr sz="153"/>
+            <a:lvl7pPr marL="384048" indent="0">
+              <a:buNone/>
+              <a:defRPr sz="140"/>
             </a:lvl7pPr>
-            <a:lvl8pPr marL="490301" indent="0">
-              <a:buNone/>
-              <a:defRPr sz="153"/>
+            <a:lvl8pPr marL="448056" indent="0">
+              <a:buNone/>
+              <a:defRPr sz="140"/>
             </a:lvl8pPr>
-            <a:lvl9pPr marL="560344" indent="0">
-              <a:buNone/>
-              <a:defRPr sz="153"/>
+            <a:lvl9pPr marL="512064" indent="0">
+              <a:buNone/>
+              <a:defRPr sz="140"/>
             </a:lvl9pPr>
           </a:lstStyle>
           <a:p>
@@ -2708,7 +2711,7 @@
           <a:p>
             <a:fld id="{1730E18E-76F0-4C7E-B4CD-A323CD5F40FF}" type="datetimeFigureOut">
               <a:rPr lang="es-MX" smtClean="0"/>
-              <a:t>06/02/2017</a:t>
+              <a:t>07/02/2017</a:t>
             </a:fld>
             <a:endParaRPr lang="es-MX"/>
           </a:p>
@@ -2759,7 +2762,7 @@
     </p:spTree>
     <p:extLst>
       <p:ext uri="{BB962C8B-B14F-4D97-AF65-F5344CB8AC3E}">
-        <p14:creationId xmlns:p14="http://schemas.microsoft.com/office/powerpoint/2010/main" val="236002864"/>
+        <p14:creationId xmlns:p14="http://schemas.microsoft.com/office/powerpoint/2010/main" val="2902936401"/>
       </p:ext>
     </p:extLst>
   </p:cSld>
@@ -2803,8 +2806,8 @@
         </p:nvSpPr>
         <p:spPr>
           <a:xfrm>
-            <a:off x="230942" y="55952"/>
-            <a:ext cx="2897267" cy="203130"/>
+            <a:off x="188595" y="51135"/>
+            <a:ext cx="2366010" cy="185640"/>
           </a:xfrm>
           <a:prstGeom prst="rect">
             <a:avLst/>
@@ -2836,8 +2839,8 @@
         </p:nvSpPr>
         <p:spPr>
           <a:xfrm>
-            <a:off x="230942" y="279760"/>
-            <a:ext cx="2897267" cy="666802"/>
+            <a:off x="188595" y="255672"/>
+            <a:ext cx="2366010" cy="609389"/>
           </a:xfrm>
           <a:prstGeom prst="rect">
             <a:avLst/>
@@ -2898,8 +2901,8 @@
         </p:nvSpPr>
         <p:spPr>
           <a:xfrm>
-            <a:off x="230941" y="974052"/>
-            <a:ext cx="755809" cy="55952"/>
+            <a:off x="188595" y="890184"/>
+            <a:ext cx="617220" cy="51134"/>
           </a:xfrm>
           <a:prstGeom prst="rect">
             <a:avLst/>
@@ -2909,7 +2912,7 @@
           <a:bodyPr vert="horz" lIns="91440" tIns="45720" rIns="91440" bIns="45720" rtlCol="0" anchor="ctr"/>
           <a:lstStyle>
             <a:lvl1pPr algn="l">
-              <a:defRPr sz="184">
+              <a:defRPr sz="168">
                 <a:solidFill>
                   <a:schemeClr val="tx1">
                     <a:tint val="75000"/>
@@ -2921,7 +2924,7 @@
           <a:p>
             <a:fld id="{1730E18E-76F0-4C7E-B4CD-A323CD5F40FF}" type="datetimeFigureOut">
               <a:rPr lang="es-MX" smtClean="0"/>
-              <a:t>06/02/2017</a:t>
+              <a:t>07/02/2017</a:t>
             </a:fld>
             <a:endParaRPr lang="es-MX"/>
           </a:p>
@@ -2939,8 +2942,8 @@
         </p:nvSpPr>
         <p:spPr>
           <a:xfrm>
-            <a:off x="1112719" y="974052"/>
-            <a:ext cx="1133713" cy="55952"/>
+            <a:off x="908685" y="890184"/>
+            <a:ext cx="925830" cy="51134"/>
           </a:xfrm>
           <a:prstGeom prst="rect">
             <a:avLst/>
@@ -2950,7 +2953,7 @@
           <a:bodyPr vert="horz" lIns="91440" tIns="45720" rIns="91440" bIns="45720" rtlCol="0" anchor="ctr"/>
           <a:lstStyle>
             <a:lvl1pPr algn="ctr">
-              <a:defRPr sz="184">
+              <a:defRPr sz="168">
                 <a:solidFill>
                   <a:schemeClr val="tx1">
                     <a:tint val="75000"/>
@@ -2976,8 +2979,8 @@
         </p:nvSpPr>
         <p:spPr>
           <a:xfrm>
-            <a:off x="2372400" y="974052"/>
-            <a:ext cx="755809" cy="55952"/>
+            <a:off x="1937385" y="890184"/>
+            <a:ext cx="617220" cy="51134"/>
           </a:xfrm>
           <a:prstGeom prst="rect">
             <a:avLst/>
@@ -2987,7 +2990,7 @@
           <a:bodyPr vert="horz" lIns="91440" tIns="45720" rIns="91440" bIns="45720" rtlCol="0" anchor="ctr"/>
           <a:lstStyle>
             <a:lvl1pPr algn="r">
-              <a:defRPr sz="184">
+              <a:defRPr sz="168">
                 <a:solidFill>
                   <a:schemeClr val="tx1">
                     <a:tint val="75000"/>
@@ -3008,27 +3011,27 @@
     </p:spTree>
     <p:extLst>
       <p:ext uri="{BB962C8B-B14F-4D97-AF65-F5344CB8AC3E}">
-        <p14:creationId xmlns:p14="http://schemas.microsoft.com/office/powerpoint/2010/main" val="70670015"/>
+        <p14:creationId xmlns:p14="http://schemas.microsoft.com/office/powerpoint/2010/main" val="31934333"/>
       </p:ext>
     </p:extLst>
   </p:cSld>
   <p:clrMap bg1="lt1" tx1="dk1" bg2="lt2" tx2="dk2" accent1="accent1" accent2="accent2" accent3="accent3" accent4="accent4" accent5="accent5" accent6="accent6" hlink="hlink" folHlink="folHlink"/>
   <p:sldLayoutIdLst>
-    <p:sldLayoutId id="2147483745" r:id="rId1"/>
-    <p:sldLayoutId id="2147483746" r:id="rId2"/>
-    <p:sldLayoutId id="2147483747" r:id="rId3"/>
-    <p:sldLayoutId id="2147483748" r:id="rId4"/>
-    <p:sldLayoutId id="2147483749" r:id="rId5"/>
-    <p:sldLayoutId id="2147483750" r:id="rId6"/>
-    <p:sldLayoutId id="2147483751" r:id="rId7"/>
-    <p:sldLayoutId id="2147483752" r:id="rId8"/>
-    <p:sldLayoutId id="2147483753" r:id="rId9"/>
-    <p:sldLayoutId id="2147483754" r:id="rId10"/>
-    <p:sldLayoutId id="2147483755" r:id="rId11"/>
+    <p:sldLayoutId id="2147483781" r:id="rId1"/>
+    <p:sldLayoutId id="2147483782" r:id="rId2"/>
+    <p:sldLayoutId id="2147483783" r:id="rId3"/>
+    <p:sldLayoutId id="2147483784" r:id="rId4"/>
+    <p:sldLayoutId id="2147483785" r:id="rId5"/>
+    <p:sldLayoutId id="2147483786" r:id="rId6"/>
+    <p:sldLayoutId id="2147483787" r:id="rId7"/>
+    <p:sldLayoutId id="2147483788" r:id="rId8"/>
+    <p:sldLayoutId id="2147483789" r:id="rId9"/>
+    <p:sldLayoutId id="2147483790" r:id="rId10"/>
+    <p:sldLayoutId id="2147483791" r:id="rId11"/>
   </p:sldLayoutIdLst>
   <p:txStyles>
     <p:titleStyle>
-      <a:lvl1pPr algn="l" defTabSz="140086" rtl="0" eaLnBrk="1" latinLnBrk="0" hangingPunct="1">
+      <a:lvl1pPr algn="l" defTabSz="128016" rtl="0" eaLnBrk="1" latinLnBrk="0" hangingPunct="1">
         <a:lnSpc>
           <a:spcPct val="90000"/>
         </a:lnSpc>
@@ -3036,7 +3039,7 @@
           <a:spcPct val="0"/>
         </a:spcBef>
         <a:buNone/>
-        <a:defRPr sz="674" kern="1200">
+        <a:defRPr sz="616" kern="1200">
           <a:solidFill>
             <a:schemeClr val="tx1"/>
           </a:solidFill>
@@ -3047,16 +3050,16 @@
       </a:lvl1pPr>
     </p:titleStyle>
     <p:bodyStyle>
-      <a:lvl1pPr marL="35022" indent="-35022" algn="l" defTabSz="140086" rtl="0" eaLnBrk="1" latinLnBrk="0" hangingPunct="1">
+      <a:lvl1pPr marL="32004" indent="-32004" algn="l" defTabSz="128016" rtl="0" eaLnBrk="1" latinLnBrk="0" hangingPunct="1">
         <a:lnSpc>
           <a:spcPct val="90000"/>
         </a:lnSpc>
         <a:spcBef>
-          <a:spcPts val="153"/>
+          <a:spcPts val="140"/>
         </a:spcBef>
         <a:buFont typeface="Arial" panose="020B0604020202020204" pitchFamily="34" charset="0"/>
         <a:buChar char="•"/>
-        <a:defRPr sz="429" kern="1200">
+        <a:defRPr sz="392" kern="1200">
           <a:solidFill>
             <a:schemeClr val="tx1"/>
           </a:solidFill>
@@ -3065,16 +3068,16 @@
           <a:cs typeface="+mn-cs"/>
         </a:defRPr>
       </a:lvl1pPr>
-      <a:lvl2pPr marL="105065" indent="-35022" algn="l" defTabSz="140086" rtl="0" eaLnBrk="1" latinLnBrk="0" hangingPunct="1">
+      <a:lvl2pPr marL="96012" indent="-32004" algn="l" defTabSz="128016" rtl="0" eaLnBrk="1" latinLnBrk="0" hangingPunct="1">
         <a:lnSpc>
           <a:spcPct val="90000"/>
         </a:lnSpc>
         <a:spcBef>
-          <a:spcPts val="77"/>
+          <a:spcPts val="70"/>
         </a:spcBef>
         <a:buFont typeface="Arial" panose="020B0604020202020204" pitchFamily="34" charset="0"/>
         <a:buChar char="•"/>
-        <a:defRPr sz="368" kern="1200">
+        <a:defRPr sz="336" kern="1200">
           <a:solidFill>
             <a:schemeClr val="tx1"/>
           </a:solidFill>
@@ -3083,16 +3086,16 @@
           <a:cs typeface="+mn-cs"/>
         </a:defRPr>
       </a:lvl2pPr>
-      <a:lvl3pPr marL="175108" indent="-35022" algn="l" defTabSz="140086" rtl="0" eaLnBrk="1" latinLnBrk="0" hangingPunct="1">
+      <a:lvl3pPr marL="160020" indent="-32004" algn="l" defTabSz="128016" rtl="0" eaLnBrk="1" latinLnBrk="0" hangingPunct="1">
         <a:lnSpc>
           <a:spcPct val="90000"/>
         </a:lnSpc>
         <a:spcBef>
-          <a:spcPts val="77"/>
+          <a:spcPts val="70"/>
         </a:spcBef>
         <a:buFont typeface="Arial" panose="020B0604020202020204" pitchFamily="34" charset="0"/>
         <a:buChar char="•"/>
-        <a:defRPr sz="306" kern="1200">
+        <a:defRPr sz="280" kern="1200">
           <a:solidFill>
             <a:schemeClr val="tx1"/>
           </a:solidFill>
@@ -3101,16 +3104,16 @@
           <a:cs typeface="+mn-cs"/>
         </a:defRPr>
       </a:lvl3pPr>
-      <a:lvl4pPr marL="245151" indent="-35022" algn="l" defTabSz="140086" rtl="0" eaLnBrk="1" latinLnBrk="0" hangingPunct="1">
+      <a:lvl4pPr marL="224028" indent="-32004" algn="l" defTabSz="128016" rtl="0" eaLnBrk="1" latinLnBrk="0" hangingPunct="1">
         <a:lnSpc>
           <a:spcPct val="90000"/>
         </a:lnSpc>
         <a:spcBef>
-          <a:spcPts val="77"/>
+          <a:spcPts val="70"/>
         </a:spcBef>
         <a:buFont typeface="Arial" panose="020B0604020202020204" pitchFamily="34" charset="0"/>
         <a:buChar char="•"/>
-        <a:defRPr sz="276" kern="1200">
+        <a:defRPr sz="252" kern="1200">
           <a:solidFill>
             <a:schemeClr val="tx1"/>
           </a:solidFill>
@@ -3119,16 +3122,16 @@
           <a:cs typeface="+mn-cs"/>
         </a:defRPr>
       </a:lvl4pPr>
-      <a:lvl5pPr marL="315194" indent="-35022" algn="l" defTabSz="140086" rtl="0" eaLnBrk="1" latinLnBrk="0" hangingPunct="1">
+      <a:lvl5pPr marL="288036" indent="-32004" algn="l" defTabSz="128016" rtl="0" eaLnBrk="1" latinLnBrk="0" hangingPunct="1">
         <a:lnSpc>
           <a:spcPct val="90000"/>
         </a:lnSpc>
         <a:spcBef>
-          <a:spcPts val="77"/>
+          <a:spcPts val="70"/>
         </a:spcBef>
         <a:buFont typeface="Arial" panose="020B0604020202020204" pitchFamily="34" charset="0"/>
         <a:buChar char="•"/>
-        <a:defRPr sz="276" kern="1200">
+        <a:defRPr sz="252" kern="1200">
           <a:solidFill>
             <a:schemeClr val="tx1"/>
           </a:solidFill>
@@ -3137,16 +3140,16 @@
           <a:cs typeface="+mn-cs"/>
         </a:defRPr>
       </a:lvl5pPr>
-      <a:lvl6pPr marL="385237" indent="-35022" algn="l" defTabSz="140086" rtl="0" eaLnBrk="1" latinLnBrk="0" hangingPunct="1">
+      <a:lvl6pPr marL="352044" indent="-32004" algn="l" defTabSz="128016" rtl="0" eaLnBrk="1" latinLnBrk="0" hangingPunct="1">
         <a:lnSpc>
           <a:spcPct val="90000"/>
         </a:lnSpc>
         <a:spcBef>
-          <a:spcPts val="77"/>
+          <a:spcPts val="70"/>
         </a:spcBef>
         <a:buFont typeface="Arial" panose="020B0604020202020204" pitchFamily="34" charset="0"/>
         <a:buChar char="•"/>
-        <a:defRPr sz="276" kern="1200">
+        <a:defRPr sz="252" kern="1200">
           <a:solidFill>
             <a:schemeClr val="tx1"/>
           </a:solidFill>
@@ -3155,16 +3158,16 @@
           <a:cs typeface="+mn-cs"/>
         </a:defRPr>
       </a:lvl6pPr>
-      <a:lvl7pPr marL="455280" indent="-35022" algn="l" defTabSz="140086" rtl="0" eaLnBrk="1" latinLnBrk="0" hangingPunct="1">
+      <a:lvl7pPr marL="416052" indent="-32004" algn="l" defTabSz="128016" rtl="0" eaLnBrk="1" latinLnBrk="0" hangingPunct="1">
         <a:lnSpc>
           <a:spcPct val="90000"/>
         </a:lnSpc>
         <a:spcBef>
-          <a:spcPts val="77"/>
+          <a:spcPts val="70"/>
         </a:spcBef>
         <a:buFont typeface="Arial" panose="020B0604020202020204" pitchFamily="34" charset="0"/>
         <a:buChar char="•"/>
-        <a:defRPr sz="276" kern="1200">
+        <a:defRPr sz="252" kern="1200">
           <a:solidFill>
             <a:schemeClr val="tx1"/>
           </a:solidFill>
@@ -3173,16 +3176,16 @@
           <a:cs typeface="+mn-cs"/>
         </a:defRPr>
       </a:lvl7pPr>
-      <a:lvl8pPr marL="525323" indent="-35022" algn="l" defTabSz="140086" rtl="0" eaLnBrk="1" latinLnBrk="0" hangingPunct="1">
+      <a:lvl8pPr marL="480060" indent="-32004" algn="l" defTabSz="128016" rtl="0" eaLnBrk="1" latinLnBrk="0" hangingPunct="1">
         <a:lnSpc>
           <a:spcPct val="90000"/>
         </a:lnSpc>
         <a:spcBef>
-          <a:spcPts val="77"/>
+          <a:spcPts val="70"/>
         </a:spcBef>
         <a:buFont typeface="Arial" panose="020B0604020202020204" pitchFamily="34" charset="0"/>
         <a:buChar char="•"/>
-        <a:defRPr sz="276" kern="1200">
+        <a:defRPr sz="252" kern="1200">
           <a:solidFill>
             <a:schemeClr val="tx1"/>
           </a:solidFill>
@@ -3191,16 +3194,16 @@
           <a:cs typeface="+mn-cs"/>
         </a:defRPr>
       </a:lvl8pPr>
-      <a:lvl9pPr marL="595366" indent="-35022" algn="l" defTabSz="140086" rtl="0" eaLnBrk="1" latinLnBrk="0" hangingPunct="1">
+      <a:lvl9pPr marL="544068" indent="-32004" algn="l" defTabSz="128016" rtl="0" eaLnBrk="1" latinLnBrk="0" hangingPunct="1">
         <a:lnSpc>
           <a:spcPct val="90000"/>
         </a:lnSpc>
         <a:spcBef>
-          <a:spcPts val="77"/>
+          <a:spcPts val="70"/>
         </a:spcBef>
         <a:buFont typeface="Arial" panose="020B0604020202020204" pitchFamily="34" charset="0"/>
         <a:buChar char="•"/>
-        <a:defRPr sz="276" kern="1200">
+        <a:defRPr sz="252" kern="1200">
           <a:solidFill>
             <a:schemeClr val="tx1"/>
           </a:solidFill>
@@ -3214,8 +3217,8 @@
       <a:defPPr>
         <a:defRPr lang="en-US"/>
       </a:defPPr>
-      <a:lvl1pPr marL="0" algn="l" defTabSz="140086" rtl="0" eaLnBrk="1" latinLnBrk="0" hangingPunct="1">
-        <a:defRPr sz="276" kern="1200">
+      <a:lvl1pPr marL="0" algn="l" defTabSz="128016" rtl="0" eaLnBrk="1" latinLnBrk="0" hangingPunct="1">
+        <a:defRPr sz="252" kern="1200">
           <a:solidFill>
             <a:schemeClr val="tx1"/>
           </a:solidFill>
@@ -3224,8 +3227,8 @@
           <a:cs typeface="+mn-cs"/>
         </a:defRPr>
       </a:lvl1pPr>
-      <a:lvl2pPr marL="70043" algn="l" defTabSz="140086" rtl="0" eaLnBrk="1" latinLnBrk="0" hangingPunct="1">
-        <a:defRPr sz="276" kern="1200">
+      <a:lvl2pPr marL="64008" algn="l" defTabSz="128016" rtl="0" eaLnBrk="1" latinLnBrk="0" hangingPunct="1">
+        <a:defRPr sz="252" kern="1200">
           <a:solidFill>
             <a:schemeClr val="tx1"/>
           </a:solidFill>
@@ -3234,8 +3237,8 @@
           <a:cs typeface="+mn-cs"/>
         </a:defRPr>
       </a:lvl2pPr>
-      <a:lvl3pPr marL="140086" algn="l" defTabSz="140086" rtl="0" eaLnBrk="1" latinLnBrk="0" hangingPunct="1">
-        <a:defRPr sz="276" kern="1200">
+      <a:lvl3pPr marL="128016" algn="l" defTabSz="128016" rtl="0" eaLnBrk="1" latinLnBrk="0" hangingPunct="1">
+        <a:defRPr sz="252" kern="1200">
           <a:solidFill>
             <a:schemeClr val="tx1"/>
           </a:solidFill>
@@ -3244,8 +3247,8 @@
           <a:cs typeface="+mn-cs"/>
         </a:defRPr>
       </a:lvl3pPr>
-      <a:lvl4pPr marL="210129" algn="l" defTabSz="140086" rtl="0" eaLnBrk="1" latinLnBrk="0" hangingPunct="1">
-        <a:defRPr sz="276" kern="1200">
+      <a:lvl4pPr marL="192024" algn="l" defTabSz="128016" rtl="0" eaLnBrk="1" latinLnBrk="0" hangingPunct="1">
+        <a:defRPr sz="252" kern="1200">
           <a:solidFill>
             <a:schemeClr val="tx1"/>
           </a:solidFill>
@@ -3254,8 +3257,8 @@
           <a:cs typeface="+mn-cs"/>
         </a:defRPr>
       </a:lvl4pPr>
-      <a:lvl5pPr marL="280172" algn="l" defTabSz="140086" rtl="0" eaLnBrk="1" latinLnBrk="0" hangingPunct="1">
-        <a:defRPr sz="276" kern="1200">
+      <a:lvl5pPr marL="256032" algn="l" defTabSz="128016" rtl="0" eaLnBrk="1" latinLnBrk="0" hangingPunct="1">
+        <a:defRPr sz="252" kern="1200">
           <a:solidFill>
             <a:schemeClr val="tx1"/>
           </a:solidFill>
@@ -3264,8 +3267,8 @@
           <a:cs typeface="+mn-cs"/>
         </a:defRPr>
       </a:lvl5pPr>
-      <a:lvl6pPr marL="350215" algn="l" defTabSz="140086" rtl="0" eaLnBrk="1" latinLnBrk="0" hangingPunct="1">
-        <a:defRPr sz="276" kern="1200">
+      <a:lvl6pPr marL="320040" algn="l" defTabSz="128016" rtl="0" eaLnBrk="1" latinLnBrk="0" hangingPunct="1">
+        <a:defRPr sz="252" kern="1200">
           <a:solidFill>
             <a:schemeClr val="tx1"/>
           </a:solidFill>
@@ -3274,8 +3277,8 @@
           <a:cs typeface="+mn-cs"/>
         </a:defRPr>
       </a:lvl6pPr>
-      <a:lvl7pPr marL="420258" algn="l" defTabSz="140086" rtl="0" eaLnBrk="1" latinLnBrk="0" hangingPunct="1">
-        <a:defRPr sz="276" kern="1200">
+      <a:lvl7pPr marL="384048" algn="l" defTabSz="128016" rtl="0" eaLnBrk="1" latinLnBrk="0" hangingPunct="1">
+        <a:defRPr sz="252" kern="1200">
           <a:solidFill>
             <a:schemeClr val="tx1"/>
           </a:solidFill>
@@ -3284,8 +3287,8 @@
           <a:cs typeface="+mn-cs"/>
         </a:defRPr>
       </a:lvl7pPr>
-      <a:lvl8pPr marL="490301" algn="l" defTabSz="140086" rtl="0" eaLnBrk="1" latinLnBrk="0" hangingPunct="1">
-        <a:defRPr sz="276" kern="1200">
+      <a:lvl8pPr marL="448056" algn="l" defTabSz="128016" rtl="0" eaLnBrk="1" latinLnBrk="0" hangingPunct="1">
+        <a:defRPr sz="252" kern="1200">
           <a:solidFill>
             <a:schemeClr val="tx1"/>
           </a:solidFill>
@@ -3294,8 +3297,8 @@
           <a:cs typeface="+mn-cs"/>
         </a:defRPr>
       </a:lvl8pPr>
-      <a:lvl9pPr marL="560344" algn="l" defTabSz="140086" rtl="0" eaLnBrk="1" latinLnBrk="0" hangingPunct="1">
-        <a:defRPr sz="276" kern="1200">
+      <a:lvl9pPr marL="512064" algn="l" defTabSz="128016" rtl="0" eaLnBrk="1" latinLnBrk="0" hangingPunct="1">
+        <a:defRPr sz="252" kern="1200">
           <a:solidFill>
             <a:schemeClr val="tx1"/>
           </a:solidFill>
@@ -3328,43 +3331,25 @@
       </p:grpSpPr>
       <p:pic>
         <p:nvPicPr>
-          <p:cNvPr id="6" name="Picture 2" descr="https://lh5.googleusercontent.com/3pdt4f3BhVX4AjtvP13mfBO684deCgHh5lvBR7CldOLAGShjkQWa43yPJon7Jroos4MdWWztDtSClwi9FLCPp__59OXCVr6kg48HMdXh5rDmff0LxRQbJG0ne4iCZzdJESM2JjPF"/>
+          <p:cNvPr id="9" name="Imagen 8"/>
           <p:cNvPicPr>
-            <a:picLocks noChangeAspect="1" noChangeArrowheads="1"/>
+            <a:picLocks noChangeAspect="1"/>
           </p:cNvPicPr>
           <p:nvPr/>
         </p:nvPicPr>
-        <p:blipFill>
-          <a:blip r:embed="rId2">
-            <a:extLst>
-              <a:ext uri="{28A0092B-C50C-407E-A947-70E740481C1C}">
-                <a14:useLocalDpi xmlns:a14="http://schemas.microsoft.com/office/drawing/2010/main" val="0"/>
-              </a:ext>
-            </a:extLst>
-          </a:blip>
-          <a:srcRect/>
-          <a:stretch>
-            <a:fillRect/>
-          </a:stretch>
+        <p:blipFill rotWithShape="1">
+          <a:blip r:embed="rId2"/>
+          <a:srcRect l="2945" t="5740" r="2618" b="5136"/>
+          <a:stretch/>
         </p:blipFill>
-        <p:spPr bwMode="auto">
+        <p:spPr>
           <a:xfrm>
-            <a:off x="0" y="21837"/>
-            <a:ext cx="3360418" cy="1029088"/>
+            <a:off x="0" y="17463"/>
+            <a:ext cx="2752725" cy="936625"/>
           </a:xfrm>
           <a:prstGeom prst="rect">
             <a:avLst/>
           </a:prstGeom>
-          <a:noFill/>
-          <a:extLst>
-            <a:ext uri="{909E8E84-426E-40DD-AFC4-6F175D3DCCD1}">
-              <a14:hiddenFill xmlns:a14="http://schemas.microsoft.com/office/drawing/2010/main">
-                <a:solidFill>
-                  <a:srgbClr val="FFFFFF"/>
-                </a:solidFill>
-              </a14:hiddenFill>
-            </a:ext>
-          </a:extLst>
         </p:spPr>
       </p:pic>
     </p:spTree>

</xml_diff>